<commit_message>
link to survey and presentation
</commit_message>
<xml_diff>
--- a/API/REST/REST_bitesized.pptx
+++ b/API/REST/REST_bitesized.pptx
@@ -5,7 +5,7 @@
     <p:sldMasterId id="2147483660" r:id="rId1"/>
   </p:sldMasterIdLst>
   <p:notesMasterIdLst>
-    <p:notesMasterId r:id="rId64"/>
+    <p:notesMasterId r:id="rId66"/>
   </p:notesMasterIdLst>
   <p:sldIdLst>
     <p:sldId id="257" r:id="rId2"/>
@@ -59,17 +59,19 @@
     <p:sldId id="348" r:id="rId50"/>
     <p:sldId id="346" r:id="rId51"/>
     <p:sldId id="349" r:id="rId52"/>
-    <p:sldId id="350" r:id="rId53"/>
-    <p:sldId id="287" r:id="rId54"/>
-    <p:sldId id="300" r:id="rId55"/>
-    <p:sldId id="295" r:id="rId56"/>
-    <p:sldId id="301" r:id="rId57"/>
-    <p:sldId id="302" r:id="rId58"/>
-    <p:sldId id="273" r:id="rId59"/>
-    <p:sldId id="282" r:id="rId60"/>
-    <p:sldId id="289" r:id="rId61"/>
-    <p:sldId id="290" r:id="rId62"/>
-    <p:sldId id="305" r:id="rId63"/>
+    <p:sldId id="352" r:id="rId53"/>
+    <p:sldId id="353" r:id="rId54"/>
+    <p:sldId id="350" r:id="rId55"/>
+    <p:sldId id="287" r:id="rId56"/>
+    <p:sldId id="300" r:id="rId57"/>
+    <p:sldId id="295" r:id="rId58"/>
+    <p:sldId id="301" r:id="rId59"/>
+    <p:sldId id="302" r:id="rId60"/>
+    <p:sldId id="273" r:id="rId61"/>
+    <p:sldId id="282" r:id="rId62"/>
+    <p:sldId id="289" r:id="rId63"/>
+    <p:sldId id="290" r:id="rId64"/>
+    <p:sldId id="305" r:id="rId65"/>
   </p:sldIdLst>
   <p:sldSz cx="9144000" cy="6858000" type="screen4x3"/>
   <p:notesSz cx="6858000" cy="9144000"/>
@@ -4154,7 +4156,7 @@
                 <a:latin typeface="Calibri"/>
               </a:rPr>
               <a:pPr/>
-              <a:t>52</a:t>
+              <a:t>54</a:t>
             </a:fld>
             <a:endParaRPr lang="en-US">
               <a:solidFill>
@@ -13148,7 +13150,7 @@
           <a:p>
             <a:r>
               <a:rPr lang="en-US" dirty="0" smtClean="0"/>
-              <a:t>Documentation and Help</a:t>
+              <a:t>Presentation</a:t>
             </a:r>
             <a:endParaRPr lang="en-US" dirty="0"/>
           </a:p>
@@ -13186,254 +13188,70 @@
               </a:rPr>
               <a:t>/</a:t>
             </a:r>
-          </a:p>
-          <a:p>
-            <a:pPr lvl="1"/>
-            <a:r>
-              <a:rPr lang="en-US" dirty="0" smtClean="0"/>
-              <a:t>This presentation</a:t>
-            </a:r>
-            <a:endParaRPr lang="en-US" dirty="0">
-              <a:hlinkClick r:id="rId2"/>
-            </a:endParaRPr>
-          </a:p>
-          <a:p>
-            <a:r>
-              <a:rPr lang="en-US" sz="2400" dirty="0" smtClean="0">
-                <a:hlinkClick r:id="rId2"/>
-              </a:rPr>
-              <a:t>https</a:t>
-            </a:r>
-            <a:r>
-              <a:rPr lang="en-US" sz="2400" dirty="0">
-                <a:hlinkClick r:id="rId2"/>
-              </a:rPr>
-              <a:t>://github.com/Ensembl/ensembl-rest/</a:t>
-            </a:r>
-            <a:r>
-              <a:rPr lang="en-US" sz="2400" dirty="0" smtClean="0">
-                <a:hlinkClick r:id="rId2"/>
-              </a:rPr>
-              <a:t>wiki</a:t>
-            </a:r>
             <a:endParaRPr lang="en-US" sz="2400" dirty="0" smtClean="0"/>
           </a:p>
           <a:p>
-            <a:pPr lvl="1"/>
-            <a:r>
-              <a:rPr lang="en-US" dirty="0" smtClean="0"/>
-              <a:t>How to write your first client</a:t>
-            </a:r>
-          </a:p>
-          <a:p>
-            <a:pPr lvl="1"/>
-            <a:r>
-              <a:rPr lang="en-US" dirty="0" smtClean="0"/>
-              <a:t>How to write POST requests</a:t>
-            </a:r>
-          </a:p>
-          <a:p>
-            <a:pPr>
-              <a:spcBef>
-                <a:spcPts val="550"/>
-              </a:spcBef>
-              <a:buFont typeface="Times New Roman" charset="0"/>
-              <a:buChar char="•"/>
-              <a:defRPr/>
-            </a:pPr>
-            <a:r>
-              <a:rPr lang="en-US" sz="2400" dirty="0" err="1">
-                <a:solidFill>
-                  <a:srgbClr val="000080"/>
-                </a:solidFill>
-              </a:rPr>
-              <a:t>dev@ensembl.org</a:t>
-            </a:r>
-            <a:r>
-              <a:rPr lang="en-US" sz="2400" dirty="0">
-                <a:solidFill>
-                  <a:srgbClr val="000080"/>
-                </a:solidFill>
-              </a:rPr>
-              <a:t> mailing list:</a:t>
-            </a:r>
-          </a:p>
-          <a:p>
-            <a:pPr>
-              <a:spcBef>
-                <a:spcPts val="500"/>
-              </a:spcBef>
-              <a:buClrTx/>
-              <a:buFontTx/>
-              <a:buNone/>
-              <a:defRPr/>
-            </a:pPr>
-            <a:r>
-              <a:rPr lang="en-US" sz="2400" dirty="0">
-                <a:solidFill>
-                  <a:srgbClr val="000080"/>
-                </a:solidFill>
-              </a:rPr>
-              <a:t> 	</a:t>
-            </a:r>
-            <a:r>
-              <a:rPr lang="en-US" sz="2000" dirty="0">
-                <a:solidFill>
-                  <a:srgbClr val="004A4A"/>
-                </a:solidFill>
-              </a:rPr>
-              <a:t>http://</a:t>
-            </a:r>
-            <a:r>
-              <a:rPr lang="en-US" sz="2000" dirty="0" err="1">
-                <a:solidFill>
-                  <a:srgbClr val="004A4A"/>
-                </a:solidFill>
-              </a:rPr>
-              <a:t>www.ensembl.org</a:t>
-            </a:r>
-            <a:r>
-              <a:rPr lang="en-US" sz="2000" dirty="0">
-                <a:solidFill>
-                  <a:srgbClr val="004A4A"/>
-                </a:solidFill>
-              </a:rPr>
-              <a:t>/info/about/contact/</a:t>
-            </a:r>
-            <a:r>
-              <a:rPr lang="en-US" sz="2000" dirty="0" err="1">
-                <a:solidFill>
-                  <a:srgbClr val="004A4A"/>
-                </a:solidFill>
-              </a:rPr>
-              <a:t>mailing.html</a:t>
-            </a:r>
-            <a:endParaRPr lang="en-US" sz="2000" dirty="0">
+            <a:endParaRPr lang="en-US" sz="2400" dirty="0">
               <a:solidFill>
                 <a:srgbClr val="004A4A"/>
               </a:solidFill>
             </a:endParaRPr>
           </a:p>
           <a:p>
-            <a:pPr>
-              <a:spcBef>
-                <a:spcPts val="500"/>
-              </a:spcBef>
-              <a:buClrTx/>
-              <a:buFontTx/>
-              <a:buNone/>
-              <a:defRPr/>
-            </a:pPr>
-            <a:r>
-              <a:rPr lang="en-US" sz="2000" dirty="0">
+            <a:pPr lvl="1"/>
+            <a:r>
+              <a:rPr lang="en-US" sz="1800" dirty="0">
                 <a:solidFill>
                   <a:srgbClr val="004A4A"/>
                 </a:solidFill>
+                <a:hlinkClick r:id="rId3"/>
               </a:rPr>
-              <a:t>	searchable mailing list archive: </a:t>
-            </a:r>
-          </a:p>
-          <a:p>
-            <a:pPr>
-              <a:spcBef>
-                <a:spcPts val="500"/>
-              </a:spcBef>
-              <a:buClrTx/>
-              <a:buFontTx/>
-              <a:buNone/>
-              <a:defRPr/>
-            </a:pPr>
-            <a:r>
-              <a:rPr lang="en-US" sz="2000" dirty="0">
+              <a:t>https://github.com/Ensembl/ensembl-presentation/blob/master/API/REST/REST_bitesized.pptx?raw=</a:t>
+            </a:r>
+            <a:r>
+              <a:rPr lang="en-US" sz="1800" dirty="0" smtClean="0">
                 <a:solidFill>
                   <a:srgbClr val="004A4A"/>
                 </a:solidFill>
+                <a:hlinkClick r:id="rId3"/>
               </a:rPr>
-              <a:t>	http://</a:t>
-            </a:r>
-            <a:r>
-              <a:rPr lang="en-US" sz="2000" dirty="0" err="1">
-                <a:solidFill>
-                  <a:srgbClr val="004A4A"/>
-                </a:solidFill>
-              </a:rPr>
-              <a:t>blog.gmane.org</a:t>
-            </a:r>
-            <a:r>
-              <a:rPr lang="en-US" sz="2000" dirty="0">
-                <a:solidFill>
-                  <a:srgbClr val="004A4A"/>
-                </a:solidFill>
-              </a:rPr>
-              <a:t>/</a:t>
-            </a:r>
-            <a:r>
-              <a:rPr lang="en-US" sz="2000" dirty="0" err="1">
-                <a:solidFill>
-                  <a:srgbClr val="004A4A"/>
-                </a:solidFill>
-              </a:rPr>
-              <a:t>gmane.science.biology.ensembl.devel</a:t>
-            </a:r>
-            <a:endParaRPr lang="en-US" sz="2000" dirty="0">
+              <a:t>true</a:t>
+            </a:r>
+            <a:endParaRPr lang="en-US" sz="1800" dirty="0" smtClean="0">
               <a:solidFill>
                 <a:srgbClr val="004A4A"/>
               </a:solidFill>
             </a:endParaRPr>
           </a:p>
           <a:p>
-            <a:pPr>
-              <a:spcBef>
-                <a:spcPts val="550"/>
-              </a:spcBef>
-              <a:buFont typeface="Times New Roman" charset="0"/>
-              <a:buChar char="•"/>
-              <a:defRPr/>
-            </a:pPr>
-            <a:r>
-              <a:rPr lang="en-US" sz="2400" dirty="0" err="1">
-                <a:solidFill>
-                  <a:srgbClr val="000080"/>
-                </a:solidFill>
-              </a:rPr>
-              <a:t>Ensembl</a:t>
-            </a:r>
-            <a:r>
-              <a:rPr lang="en-US" sz="2400" dirty="0">
-                <a:solidFill>
-                  <a:srgbClr val="000080"/>
-                </a:solidFill>
-              </a:rPr>
-              <a:t> helpdesk:</a:t>
-            </a:r>
-          </a:p>
-          <a:p>
-            <a:pPr>
-              <a:spcBef>
-                <a:spcPts val="500"/>
-              </a:spcBef>
-              <a:buClrTx/>
-              <a:buFontTx/>
-              <a:buNone/>
-              <a:defRPr/>
-            </a:pPr>
-            <a:r>
-              <a:rPr lang="en-US" sz="2400" dirty="0">
-                <a:solidFill>
-                  <a:srgbClr val="000080"/>
-                </a:solidFill>
-              </a:rPr>
-              <a:t>	</a:t>
-            </a:r>
-            <a:r>
-              <a:rPr lang="en-US" sz="2000" dirty="0" err="1">
+            <a:pPr lvl="1"/>
+            <a:r>
+              <a:rPr lang="en-US" sz="1800" dirty="0">
                 <a:solidFill>
                   <a:srgbClr val="004A4A"/>
                 </a:solidFill>
+                <a:hlinkClick r:id="rId4"/>
               </a:rPr>
-              <a:t>helpdesk@ensembl.org</a:t>
-            </a:r>
-            <a:endParaRPr lang="en-US" sz="2000" dirty="0">
+              <a:t>https://github.com/Ensembl/ensembl-presentation/blob/master/API/REST/REST_bitesized.pdf?raw=</a:t>
+            </a:r>
+            <a:r>
+              <a:rPr lang="en-US" sz="1800" dirty="0" smtClean="0">
+                <a:solidFill>
+                  <a:srgbClr val="004A4A"/>
+                </a:solidFill>
+                <a:hlinkClick r:id="rId4"/>
+              </a:rPr>
+              <a:t>true</a:t>
+            </a:r>
+            <a:endParaRPr lang="en-US" sz="1800" dirty="0" smtClean="0">
+              <a:solidFill>
+                <a:srgbClr val="004A4A"/>
+              </a:solidFill>
+            </a:endParaRPr>
+          </a:p>
+          <a:p>
+            <a:pPr lvl="1"/>
+            <a:endParaRPr lang="en-US" sz="1800" dirty="0">
               <a:solidFill>
                 <a:srgbClr val="004A4A"/>
               </a:solidFill>
@@ -17791,6 +17609,480 @@
 </file>
 
 <file path=ppt/slides/slide52.xml><?xml version="1.0" encoding="utf-8"?>
+<p:sld xmlns:a="http://schemas.openxmlformats.org/drawingml/2006/main" xmlns:r="http://schemas.openxmlformats.org/officeDocument/2006/relationships" xmlns:p="http://schemas.openxmlformats.org/presentationml/2006/main">
+  <p:cSld>
+    <p:spTree>
+      <p:nvGrpSpPr>
+        <p:cNvPr id="1" name=""/>
+        <p:cNvGrpSpPr/>
+        <p:nvPr/>
+      </p:nvGrpSpPr>
+      <p:grpSpPr>
+        <a:xfrm>
+          <a:off x="0" y="0"/>
+          <a:ext cx="0" cy="0"/>
+          <a:chOff x="0" y="0"/>
+          <a:chExt cx="0" cy="0"/>
+        </a:xfrm>
+      </p:grpSpPr>
+      <p:sp>
+        <p:nvSpPr>
+          <p:cNvPr id="2" name="Title 1"/>
+          <p:cNvSpPr>
+            <a:spLocks noGrp="1"/>
+          </p:cNvSpPr>
+          <p:nvPr>
+            <p:ph type="title"/>
+          </p:nvPr>
+        </p:nvSpPr>
+        <p:spPr/>
+        <p:txBody>
+          <a:bodyPr/>
+          <a:lstStyle/>
+          <a:p>
+            <a:r>
+              <a:rPr lang="en-US" dirty="0" smtClean="0"/>
+              <a:t>Documentation and Help</a:t>
+            </a:r>
+            <a:endParaRPr lang="en-US" dirty="0"/>
+          </a:p>
+        </p:txBody>
+      </p:sp>
+      <p:sp>
+        <p:nvSpPr>
+          <p:cNvPr id="3" name="Content Placeholder 2"/>
+          <p:cNvSpPr>
+            <a:spLocks noGrp="1"/>
+          </p:cNvSpPr>
+          <p:nvPr>
+            <p:ph idx="1"/>
+          </p:nvPr>
+        </p:nvSpPr>
+        <p:spPr>
+          <a:xfrm>
+            <a:off x="685800" y="1600199"/>
+            <a:ext cx="7772400" cy="4553441"/>
+          </a:xfrm>
+        </p:spPr>
+        <p:txBody>
+          <a:bodyPr/>
+          <a:lstStyle/>
+          <a:p>
+            <a:r>
+              <a:rPr lang="en-US" sz="2400" dirty="0">
+                <a:hlinkClick r:id="rId2"/>
+              </a:rPr>
+              <a:t>https://github.com/Ensembl/ensembl-presentation</a:t>
+            </a:r>
+            <a:r>
+              <a:rPr lang="en-US" sz="2400" dirty="0" smtClean="0">
+                <a:hlinkClick r:id="rId2"/>
+              </a:rPr>
+              <a:t>/</a:t>
+            </a:r>
+          </a:p>
+          <a:p>
+            <a:pPr lvl="1"/>
+            <a:r>
+              <a:rPr lang="en-US" dirty="0" smtClean="0"/>
+              <a:t>This presentation</a:t>
+            </a:r>
+            <a:endParaRPr lang="en-US" dirty="0">
+              <a:hlinkClick r:id="rId2"/>
+            </a:endParaRPr>
+          </a:p>
+          <a:p>
+            <a:r>
+              <a:rPr lang="en-US" sz="2400" dirty="0" smtClean="0">
+                <a:hlinkClick r:id="rId2"/>
+              </a:rPr>
+              <a:t>https</a:t>
+            </a:r>
+            <a:r>
+              <a:rPr lang="en-US" sz="2400" dirty="0">
+                <a:hlinkClick r:id="rId2"/>
+              </a:rPr>
+              <a:t>://github.com/Ensembl/ensembl-rest/</a:t>
+            </a:r>
+            <a:r>
+              <a:rPr lang="en-US" sz="2400" dirty="0" smtClean="0">
+                <a:hlinkClick r:id="rId2"/>
+              </a:rPr>
+              <a:t>wiki</a:t>
+            </a:r>
+            <a:endParaRPr lang="en-US" sz="2400" dirty="0" smtClean="0"/>
+          </a:p>
+          <a:p>
+            <a:pPr lvl="1"/>
+            <a:r>
+              <a:rPr lang="en-US" dirty="0" smtClean="0"/>
+              <a:t>How to write your first client</a:t>
+            </a:r>
+          </a:p>
+          <a:p>
+            <a:pPr lvl="1"/>
+            <a:r>
+              <a:rPr lang="en-US" dirty="0" smtClean="0"/>
+              <a:t>How to write POST requests</a:t>
+            </a:r>
+          </a:p>
+          <a:p>
+            <a:pPr>
+              <a:spcBef>
+                <a:spcPts val="550"/>
+              </a:spcBef>
+              <a:buFont typeface="Times New Roman" charset="0"/>
+              <a:buChar char="•"/>
+              <a:defRPr/>
+            </a:pPr>
+            <a:r>
+              <a:rPr lang="en-US" sz="2400" dirty="0" err="1">
+                <a:solidFill>
+                  <a:srgbClr val="000080"/>
+                </a:solidFill>
+              </a:rPr>
+              <a:t>dev@ensembl.org</a:t>
+            </a:r>
+            <a:r>
+              <a:rPr lang="en-US" sz="2400" dirty="0">
+                <a:solidFill>
+                  <a:srgbClr val="000080"/>
+                </a:solidFill>
+              </a:rPr>
+              <a:t> mailing list:</a:t>
+            </a:r>
+          </a:p>
+          <a:p>
+            <a:pPr>
+              <a:spcBef>
+                <a:spcPts val="500"/>
+              </a:spcBef>
+              <a:buClrTx/>
+              <a:buFontTx/>
+              <a:buNone/>
+              <a:defRPr/>
+            </a:pPr>
+            <a:r>
+              <a:rPr lang="en-US" sz="2400" dirty="0">
+                <a:solidFill>
+                  <a:srgbClr val="000080"/>
+                </a:solidFill>
+              </a:rPr>
+              <a:t> 	</a:t>
+            </a:r>
+            <a:r>
+              <a:rPr lang="en-US" sz="2000" dirty="0">
+                <a:solidFill>
+                  <a:srgbClr val="004A4A"/>
+                </a:solidFill>
+              </a:rPr>
+              <a:t>http://</a:t>
+            </a:r>
+            <a:r>
+              <a:rPr lang="en-US" sz="2000" dirty="0" err="1">
+                <a:solidFill>
+                  <a:srgbClr val="004A4A"/>
+                </a:solidFill>
+              </a:rPr>
+              <a:t>www.ensembl.org</a:t>
+            </a:r>
+            <a:r>
+              <a:rPr lang="en-US" sz="2000" dirty="0">
+                <a:solidFill>
+                  <a:srgbClr val="004A4A"/>
+                </a:solidFill>
+              </a:rPr>
+              <a:t>/info/about/contact/</a:t>
+            </a:r>
+            <a:r>
+              <a:rPr lang="en-US" sz="2000" dirty="0" err="1">
+                <a:solidFill>
+                  <a:srgbClr val="004A4A"/>
+                </a:solidFill>
+              </a:rPr>
+              <a:t>mailing.html</a:t>
+            </a:r>
+            <a:endParaRPr lang="en-US" sz="2000" dirty="0">
+              <a:solidFill>
+                <a:srgbClr val="004A4A"/>
+              </a:solidFill>
+            </a:endParaRPr>
+          </a:p>
+          <a:p>
+            <a:pPr>
+              <a:spcBef>
+                <a:spcPts val="500"/>
+              </a:spcBef>
+              <a:buClrTx/>
+              <a:buFontTx/>
+              <a:buNone/>
+              <a:defRPr/>
+            </a:pPr>
+            <a:r>
+              <a:rPr lang="en-US" sz="2000" dirty="0">
+                <a:solidFill>
+                  <a:srgbClr val="004A4A"/>
+                </a:solidFill>
+              </a:rPr>
+              <a:t>	</a:t>
+            </a:r>
+            <a:r>
+              <a:rPr lang="en-US" sz="2000" dirty="0" smtClean="0">
+                <a:solidFill>
+                  <a:srgbClr val="004A4A"/>
+                </a:solidFill>
+              </a:rPr>
+              <a:t>searchable mailing list archive: </a:t>
+            </a:r>
+          </a:p>
+          <a:p>
+            <a:pPr>
+              <a:spcBef>
+                <a:spcPts val="500"/>
+              </a:spcBef>
+              <a:buClrTx/>
+              <a:buFontTx/>
+              <a:buNone/>
+              <a:defRPr/>
+            </a:pPr>
+            <a:r>
+              <a:rPr lang="en-US" sz="2000" dirty="0" smtClean="0">
+                <a:solidFill>
+                  <a:srgbClr val="004A4A"/>
+                </a:solidFill>
+              </a:rPr>
+              <a:t>	http://</a:t>
+            </a:r>
+            <a:r>
+              <a:rPr lang="en-US" sz="2000" dirty="0" err="1" smtClean="0">
+                <a:solidFill>
+                  <a:srgbClr val="004A4A"/>
+                </a:solidFill>
+              </a:rPr>
+              <a:t>blog.gmane.org</a:t>
+            </a:r>
+            <a:r>
+              <a:rPr lang="en-US" sz="2000" dirty="0" smtClean="0">
+                <a:solidFill>
+                  <a:srgbClr val="004A4A"/>
+                </a:solidFill>
+              </a:rPr>
+              <a:t>/</a:t>
+            </a:r>
+            <a:r>
+              <a:rPr lang="en-US" sz="2000" dirty="0" err="1" smtClean="0">
+                <a:solidFill>
+                  <a:srgbClr val="004A4A"/>
+                </a:solidFill>
+              </a:rPr>
+              <a:t>gmane.science.biology.ensembl.devel</a:t>
+            </a:r>
+            <a:endParaRPr lang="en-US" sz="2000" dirty="0" smtClean="0">
+              <a:solidFill>
+                <a:srgbClr val="004A4A"/>
+              </a:solidFill>
+            </a:endParaRPr>
+          </a:p>
+          <a:p>
+            <a:pPr>
+              <a:spcBef>
+                <a:spcPts val="550"/>
+              </a:spcBef>
+              <a:buFont typeface="Times New Roman" charset="0"/>
+              <a:buChar char="•"/>
+              <a:defRPr/>
+            </a:pPr>
+            <a:r>
+              <a:rPr lang="en-US" sz="2400" dirty="0" err="1" smtClean="0">
+                <a:solidFill>
+                  <a:srgbClr val="000080"/>
+                </a:solidFill>
+              </a:rPr>
+              <a:t>Ensembl</a:t>
+            </a:r>
+            <a:r>
+              <a:rPr lang="en-US" sz="2400" dirty="0" smtClean="0">
+                <a:solidFill>
+                  <a:srgbClr val="000080"/>
+                </a:solidFill>
+              </a:rPr>
+              <a:t> helpdesk:</a:t>
+            </a:r>
+          </a:p>
+          <a:p>
+            <a:pPr>
+              <a:spcBef>
+                <a:spcPts val="500"/>
+              </a:spcBef>
+              <a:buClrTx/>
+              <a:buFontTx/>
+              <a:buNone/>
+              <a:defRPr/>
+            </a:pPr>
+            <a:r>
+              <a:rPr lang="en-US" sz="2400" dirty="0">
+                <a:solidFill>
+                  <a:srgbClr val="000080"/>
+                </a:solidFill>
+              </a:rPr>
+              <a:t>	</a:t>
+            </a:r>
+            <a:r>
+              <a:rPr lang="en-US" sz="2000" dirty="0" err="1">
+                <a:solidFill>
+                  <a:srgbClr val="004A4A"/>
+                </a:solidFill>
+              </a:rPr>
+              <a:t>helpdesk@ensembl.org</a:t>
+            </a:r>
+            <a:endParaRPr lang="en-US" sz="2000" dirty="0">
+              <a:solidFill>
+                <a:srgbClr val="004A4A"/>
+              </a:solidFill>
+            </a:endParaRPr>
+          </a:p>
+          <a:p>
+            <a:pPr marL="0" indent="0">
+              <a:buNone/>
+            </a:pPr>
+            <a:endParaRPr lang="en-US" dirty="0"/>
+          </a:p>
+        </p:txBody>
+      </p:sp>
+    </p:spTree>
+    <p:extLst>
+      <p:ext uri="{BB962C8B-B14F-4D97-AF65-F5344CB8AC3E}">
+        <p14:creationId xmlns:p14="http://schemas.microsoft.com/office/powerpoint/2010/main" val="1782346183"/>
+      </p:ext>
+    </p:extLst>
+  </p:cSld>
+  <p:clrMapOvr>
+    <a:masterClrMapping/>
+  </p:clrMapOvr>
+</p:sld>
+</file>
+
+<file path=ppt/slides/slide53.xml><?xml version="1.0" encoding="utf-8"?>
+<p:sld xmlns:a="http://schemas.openxmlformats.org/drawingml/2006/main" xmlns:r="http://schemas.openxmlformats.org/officeDocument/2006/relationships" xmlns:p="http://schemas.openxmlformats.org/presentationml/2006/main">
+  <p:cSld>
+    <p:spTree>
+      <p:nvGrpSpPr>
+        <p:cNvPr id="1" name=""/>
+        <p:cNvGrpSpPr/>
+        <p:nvPr/>
+      </p:nvGrpSpPr>
+      <p:grpSpPr>
+        <a:xfrm>
+          <a:off x="0" y="0"/>
+          <a:ext cx="0" cy="0"/>
+          <a:chOff x="0" y="0"/>
+          <a:chExt cx="0" cy="0"/>
+        </a:xfrm>
+      </p:grpSpPr>
+      <p:sp>
+        <p:nvSpPr>
+          <p:cNvPr id="2" name="Title 1"/>
+          <p:cNvSpPr>
+            <a:spLocks noGrp="1"/>
+          </p:cNvSpPr>
+          <p:nvPr>
+            <p:ph type="title"/>
+          </p:nvPr>
+        </p:nvSpPr>
+        <p:spPr/>
+        <p:txBody>
+          <a:bodyPr/>
+          <a:lstStyle/>
+          <a:p>
+            <a:r>
+              <a:rPr lang="en-US" dirty="0" smtClean="0"/>
+              <a:t>Feedback</a:t>
+            </a:r>
+            <a:endParaRPr lang="en-US" dirty="0"/>
+          </a:p>
+        </p:txBody>
+      </p:sp>
+      <p:sp>
+        <p:nvSpPr>
+          <p:cNvPr id="3" name="Content Placeholder 2"/>
+          <p:cNvSpPr>
+            <a:spLocks noGrp="1"/>
+          </p:cNvSpPr>
+          <p:nvPr>
+            <p:ph idx="1"/>
+          </p:nvPr>
+        </p:nvSpPr>
+        <p:spPr>
+          <a:xfrm>
+            <a:off x="685800" y="1600199"/>
+            <a:ext cx="7772400" cy="4553441"/>
+          </a:xfrm>
+        </p:spPr>
+        <p:txBody>
+          <a:bodyPr/>
+          <a:lstStyle/>
+          <a:p>
+            <a:pPr marL="0" indent="0">
+              <a:buNone/>
+            </a:pPr>
+            <a:r>
+              <a:rPr lang="en-US" sz="2400" dirty="0">
+                <a:hlinkClick r:id="rId2"/>
+              </a:rPr>
+              <a:t>http://</a:t>
+            </a:r>
+            <a:r>
+              <a:rPr lang="en-US" sz="2400" dirty="0" err="1">
+                <a:hlinkClick r:id="rId2"/>
+              </a:rPr>
+              <a:t>tinyurl.com</a:t>
+            </a:r>
+            <a:r>
+              <a:rPr lang="en-US" sz="2400" dirty="0">
+                <a:hlinkClick r:id="rId2"/>
+              </a:rPr>
+              <a:t>/</a:t>
+            </a:r>
+            <a:r>
+              <a:rPr lang="en-US" sz="2400" dirty="0" err="1">
+                <a:hlinkClick r:id="rId2"/>
+              </a:rPr>
+              <a:t>Ensembl</a:t>
+            </a:r>
+            <a:r>
+              <a:rPr lang="en-US" sz="2400" dirty="0">
+                <a:hlinkClick r:id="rId2"/>
+              </a:rPr>
+              <a:t>-REST</a:t>
+            </a:r>
+            <a:endParaRPr lang="en-US" sz="2000" dirty="0" smtClean="0">
+              <a:solidFill>
+                <a:srgbClr val="004A4A"/>
+              </a:solidFill>
+            </a:endParaRPr>
+          </a:p>
+          <a:p>
+            <a:pPr marL="0" indent="0">
+              <a:buNone/>
+            </a:pPr>
+            <a:endParaRPr lang="en-US" dirty="0"/>
+          </a:p>
+        </p:txBody>
+      </p:sp>
+    </p:spTree>
+    <p:extLst>
+      <p:ext uri="{BB962C8B-B14F-4D97-AF65-F5344CB8AC3E}">
+        <p14:creationId xmlns:p14="http://schemas.microsoft.com/office/powerpoint/2010/main" val="2688810219"/>
+      </p:ext>
+    </p:extLst>
+  </p:cSld>
+  <p:clrMapOvr>
+    <a:masterClrMapping/>
+  </p:clrMapOvr>
+</p:sld>
+</file>
+
+<file path=ppt/slides/slide54.xml><?xml version="1.0" encoding="utf-8"?>
 <p:sld xmlns:a="http://schemas.openxmlformats.org/drawingml/2006/main" xmlns:r="http://schemas.openxmlformats.org/officeDocument/2006/relationships" xmlns:p="http://schemas.openxmlformats.org/presentationml/2006/main">
   <p:cSld>
     <p:spTree>
@@ -18566,7 +18858,7 @@
 </p:sld>
 </file>
 
-<file path=ppt/slides/slide53.xml><?xml version="1.0" encoding="utf-8"?>
+<file path=ppt/slides/slide55.xml><?xml version="1.0" encoding="utf-8"?>
 <p:sld xmlns:a="http://schemas.openxmlformats.org/drawingml/2006/main" xmlns:r="http://schemas.openxmlformats.org/officeDocument/2006/relationships" xmlns:p="http://schemas.openxmlformats.org/presentationml/2006/main">
   <p:cSld>
     <p:spTree>
@@ -19627,7 +19919,7 @@
 </p:sld>
 </file>
 
-<file path=ppt/slides/slide54.xml><?xml version="1.0" encoding="utf-8"?>
+<file path=ppt/slides/slide56.xml><?xml version="1.0" encoding="utf-8"?>
 <p:sld xmlns:a="http://schemas.openxmlformats.org/drawingml/2006/main" xmlns:r="http://schemas.openxmlformats.org/officeDocument/2006/relationships" xmlns:p="http://schemas.openxmlformats.org/presentationml/2006/main">
   <p:cSld>
     <p:spTree>
@@ -20270,7 +20562,7 @@
 </p:sld>
 </file>
 
-<file path=ppt/slides/slide55.xml><?xml version="1.0" encoding="utf-8"?>
+<file path=ppt/slides/slide57.xml><?xml version="1.0" encoding="utf-8"?>
 <p:sld xmlns:a="http://schemas.openxmlformats.org/drawingml/2006/main" xmlns:r="http://schemas.openxmlformats.org/officeDocument/2006/relationships" xmlns:p="http://schemas.openxmlformats.org/presentationml/2006/main">
   <p:cSld>
     <p:spTree>
@@ -20355,7 +20647,7 @@
 </p:sld>
 </file>
 
-<file path=ppt/slides/slide56.xml><?xml version="1.0" encoding="utf-8"?>
+<file path=ppt/slides/slide58.xml><?xml version="1.0" encoding="utf-8"?>
 <p:sld xmlns:a="http://schemas.openxmlformats.org/drawingml/2006/main" xmlns:r="http://schemas.openxmlformats.org/officeDocument/2006/relationships" xmlns:p="http://schemas.openxmlformats.org/presentationml/2006/main">
   <p:cSld>
     <p:spTree>
@@ -20487,7 +20779,7 @@
 </p:sld>
 </file>
 
-<file path=ppt/slides/slide57.xml><?xml version="1.0" encoding="utf-8"?>
+<file path=ppt/slides/slide59.xml><?xml version="1.0" encoding="utf-8"?>
 <p:sld xmlns:a="http://schemas.openxmlformats.org/drawingml/2006/main" xmlns:r="http://schemas.openxmlformats.org/officeDocument/2006/relationships" xmlns:p="http://schemas.openxmlformats.org/presentationml/2006/main">
   <p:cSld>
     <p:spTree>
@@ -20723,7 +21015,245 @@
 </p:sld>
 </file>
 
-<file path=ppt/slides/slide58.xml><?xml version="1.0" encoding="utf-8"?>
+<file path=ppt/slides/slide6.xml><?xml version="1.0" encoding="utf-8"?>
+<p:sld xmlns:a="http://schemas.openxmlformats.org/drawingml/2006/main" xmlns:r="http://schemas.openxmlformats.org/officeDocument/2006/relationships" xmlns:p="http://schemas.openxmlformats.org/presentationml/2006/main">
+  <p:cSld>
+    <p:spTree>
+      <p:nvGrpSpPr>
+        <p:cNvPr id="1" name=""/>
+        <p:cNvGrpSpPr/>
+        <p:nvPr/>
+      </p:nvGrpSpPr>
+      <p:grpSpPr>
+        <a:xfrm>
+          <a:off x="0" y="0"/>
+          <a:ext cx="0" cy="0"/>
+          <a:chOff x="0" y="0"/>
+          <a:chExt cx="0" cy="0"/>
+        </a:xfrm>
+      </p:grpSpPr>
+      <p:sp>
+        <p:nvSpPr>
+          <p:cNvPr id="2" name="Title 1"/>
+          <p:cNvSpPr>
+            <a:spLocks noGrp="1"/>
+          </p:cNvSpPr>
+          <p:nvPr>
+            <p:ph type="title"/>
+          </p:nvPr>
+        </p:nvSpPr>
+        <p:spPr/>
+        <p:txBody>
+          <a:bodyPr/>
+          <a:lstStyle/>
+          <a:p>
+            <a:r>
+              <a:rPr lang="en-US" dirty="0" smtClean="0"/>
+              <a:t>What Is A REST API</a:t>
+            </a:r>
+            <a:endParaRPr lang="en-US" dirty="0"/>
+          </a:p>
+        </p:txBody>
+      </p:sp>
+      <p:sp>
+        <p:nvSpPr>
+          <p:cNvPr id="3" name="Content Placeholder 2"/>
+          <p:cNvSpPr>
+            <a:spLocks noGrp="1"/>
+          </p:cNvSpPr>
+          <p:nvPr>
+            <p:ph idx="1"/>
+          </p:nvPr>
+        </p:nvSpPr>
+        <p:spPr/>
+        <p:txBody>
+          <a:bodyPr/>
+          <a:lstStyle/>
+          <a:p>
+            <a:r>
+              <a:rPr lang="en-US" b="1" dirty="0" err="1" smtClean="0"/>
+              <a:t>RE</a:t>
+            </a:r>
+            <a:r>
+              <a:rPr lang="en-US" dirty="0" err="1" smtClean="0"/>
+              <a:t>presentational</a:t>
+            </a:r>
+            <a:r>
+              <a:rPr lang="en-US" dirty="0" smtClean="0"/>
+              <a:t> </a:t>
+            </a:r>
+            <a:r>
+              <a:rPr lang="en-US" b="1" dirty="0"/>
+              <a:t>S</a:t>
+            </a:r>
+            <a:r>
+              <a:rPr lang="en-US" dirty="0"/>
+              <a:t>tate </a:t>
+            </a:r>
+            <a:r>
+              <a:rPr lang="en-US" b="1" dirty="0"/>
+              <a:t>T</a:t>
+            </a:r>
+            <a:r>
+              <a:rPr lang="en-US" dirty="0"/>
+              <a:t>ransfer</a:t>
+            </a:r>
+          </a:p>
+          <a:p>
+            <a:endParaRPr lang="en-US" dirty="0" smtClean="0"/>
+          </a:p>
+          <a:p>
+            <a:r>
+              <a:rPr lang="en-US" dirty="0" smtClean="0"/>
+              <a:t>Simple APIs with very few external dependencies</a:t>
+            </a:r>
+          </a:p>
+          <a:p>
+            <a:endParaRPr lang="en-US" dirty="0"/>
+          </a:p>
+          <a:p>
+            <a:r>
+              <a:rPr lang="en-US" dirty="0" smtClean="0"/>
+              <a:t>Can use the web (HTTP) to communicate</a:t>
+            </a:r>
+          </a:p>
+          <a:p>
+            <a:endParaRPr lang="en-US" dirty="0"/>
+          </a:p>
+          <a:p>
+            <a:r>
+              <a:rPr lang="en-US" dirty="0" smtClean="0"/>
+              <a:t>Can be queried by</a:t>
+            </a:r>
+          </a:p>
+          <a:p>
+            <a:pPr lvl="1"/>
+            <a:r>
+              <a:rPr lang="en-US" dirty="0" smtClean="0"/>
+              <a:t>Web browsers</a:t>
+            </a:r>
+          </a:p>
+          <a:p>
+            <a:pPr lvl="1"/>
+            <a:r>
+              <a:rPr lang="en-US" dirty="0" smtClean="0"/>
+              <a:t>Command line tools</a:t>
+            </a:r>
+          </a:p>
+          <a:p>
+            <a:pPr lvl="1"/>
+            <a:r>
+              <a:rPr lang="en-US" dirty="0" smtClean="0"/>
+              <a:t>Programming languages</a:t>
+            </a:r>
+            <a:endParaRPr lang="en-US" dirty="0"/>
+          </a:p>
+        </p:txBody>
+      </p:sp>
+      <p:pic>
+        <p:nvPicPr>
+          <p:cNvPr id="4" name="Picture 3" descr="images.jpg"/>
+          <p:cNvPicPr>
+            <a:picLocks noChangeAspect="1"/>
+          </p:cNvPicPr>
+          <p:nvPr/>
+        </p:nvPicPr>
+        <p:blipFill>
+          <a:blip r:embed="rId2">
+            <a:extLst>
+              <a:ext uri="{28A0092B-C50C-407E-A947-70E740481C1C}">
+                <a14:useLocalDpi xmlns:a14="http://schemas.microsoft.com/office/drawing/2010/main" val="0"/>
+              </a:ext>
+            </a:extLst>
+          </a:blip>
+          <a:stretch>
+            <a:fillRect/>
+          </a:stretch>
+        </p:blipFill>
+        <p:spPr>
+          <a:xfrm>
+            <a:off x="7298290" y="4524030"/>
+            <a:ext cx="1257603" cy="1252014"/>
+          </a:xfrm>
+          <a:prstGeom prst="rect">
+            <a:avLst/>
+          </a:prstGeom>
+          <a:ln>
+            <a:noFill/>
+          </a:ln>
+          <a:effectLst>
+            <a:outerShdw blurRad="292100" dist="139700" dir="2700000" algn="tl" rotWithShape="0">
+              <a:srgbClr val="333333">
+                <a:alpha val="65000"/>
+              </a:srgbClr>
+            </a:outerShdw>
+          </a:effectLst>
+        </p:spPr>
+      </p:pic>
+      <p:pic>
+        <p:nvPicPr>
+          <p:cNvPr id="6" name="Picture 5" descr="url.jpg"/>
+          <p:cNvPicPr>
+            <a:picLocks noChangeAspect="1"/>
+          </p:cNvPicPr>
+          <p:nvPr/>
+        </p:nvPicPr>
+        <p:blipFill>
+          <a:blip r:embed="rId3">
+            <a:extLst>
+              <a:ext uri="{28A0092B-C50C-407E-A947-70E740481C1C}">
+                <a14:useLocalDpi xmlns:a14="http://schemas.microsoft.com/office/drawing/2010/main" val="0"/>
+              </a:ext>
+            </a:extLst>
+          </a:blip>
+          <a:stretch>
+            <a:fillRect/>
+          </a:stretch>
+        </p:blipFill>
+        <p:spPr>
+          <a:xfrm>
+            <a:off x="4212862" y="4060960"/>
+            <a:ext cx="2866338" cy="962853"/>
+          </a:xfrm>
+          <a:prstGeom prst="roundRect">
+            <a:avLst>
+              <a:gd name="adj" fmla="val 8594"/>
+            </a:avLst>
+          </a:prstGeom>
+          <a:solidFill>
+            <a:srgbClr val="FFFFFF">
+              <a:shade val="85000"/>
+            </a:srgbClr>
+          </a:solidFill>
+          <a:ln>
+            <a:noFill/>
+          </a:ln>
+          <a:effectLst>
+            <a:reflection blurRad="12700" stA="38000" endPos="28000" dist="5000" dir="5400000" sy="-100000" algn="bl" rotWithShape="0"/>
+          </a:effectLst>
+        </p:spPr>
+      </p:pic>
+    </p:spTree>
+    <p:extLst>
+      <p:ext uri="{BB962C8B-B14F-4D97-AF65-F5344CB8AC3E}">
+        <p14:creationId xmlns:p14="http://schemas.microsoft.com/office/powerpoint/2010/main" val="1579477409"/>
+      </p:ext>
+    </p:extLst>
+  </p:cSld>
+  <p:clrMapOvr>
+    <a:masterClrMapping/>
+  </p:clrMapOvr>
+  <p:timing>
+    <p:tnLst>
+      <p:par>
+        <p:cTn xmlns:p14="http://schemas.microsoft.com/office/powerpoint/2010/main" id="1" dur="indefinite" restart="never" nodeType="tmRoot"/>
+      </p:par>
+    </p:tnLst>
+  </p:timing>
+</p:sld>
+</file>
+
+<file path=ppt/slides/slide60.xml><?xml version="1.0" encoding="utf-8"?>
 <p:sld xmlns:a="http://schemas.openxmlformats.org/drawingml/2006/main" xmlns:r="http://schemas.openxmlformats.org/officeDocument/2006/relationships" xmlns:p="http://schemas.openxmlformats.org/presentationml/2006/main">
   <p:cSld>
     <p:spTree>
@@ -21266,7 +21796,7 @@
 </p:sld>
 </file>
 
-<file path=ppt/slides/slide59.xml><?xml version="1.0" encoding="utf-8"?>
+<file path=ppt/slides/slide61.xml><?xml version="1.0" encoding="utf-8"?>
 <p:sld xmlns:a="http://schemas.openxmlformats.org/drawingml/2006/main" xmlns:r="http://schemas.openxmlformats.org/officeDocument/2006/relationships" xmlns:p="http://schemas.openxmlformats.org/presentationml/2006/main">
   <p:cSld>
     <p:spTree>
@@ -22218,245 +22748,7 @@
 </p:sld>
 </file>
 
-<file path=ppt/slides/slide6.xml><?xml version="1.0" encoding="utf-8"?>
-<p:sld xmlns:a="http://schemas.openxmlformats.org/drawingml/2006/main" xmlns:r="http://schemas.openxmlformats.org/officeDocument/2006/relationships" xmlns:p="http://schemas.openxmlformats.org/presentationml/2006/main">
-  <p:cSld>
-    <p:spTree>
-      <p:nvGrpSpPr>
-        <p:cNvPr id="1" name=""/>
-        <p:cNvGrpSpPr/>
-        <p:nvPr/>
-      </p:nvGrpSpPr>
-      <p:grpSpPr>
-        <a:xfrm>
-          <a:off x="0" y="0"/>
-          <a:ext cx="0" cy="0"/>
-          <a:chOff x="0" y="0"/>
-          <a:chExt cx="0" cy="0"/>
-        </a:xfrm>
-      </p:grpSpPr>
-      <p:sp>
-        <p:nvSpPr>
-          <p:cNvPr id="2" name="Title 1"/>
-          <p:cNvSpPr>
-            <a:spLocks noGrp="1"/>
-          </p:cNvSpPr>
-          <p:nvPr>
-            <p:ph type="title"/>
-          </p:nvPr>
-        </p:nvSpPr>
-        <p:spPr/>
-        <p:txBody>
-          <a:bodyPr/>
-          <a:lstStyle/>
-          <a:p>
-            <a:r>
-              <a:rPr lang="en-US" dirty="0" smtClean="0"/>
-              <a:t>What Is A REST API</a:t>
-            </a:r>
-            <a:endParaRPr lang="en-US" dirty="0"/>
-          </a:p>
-        </p:txBody>
-      </p:sp>
-      <p:sp>
-        <p:nvSpPr>
-          <p:cNvPr id="3" name="Content Placeholder 2"/>
-          <p:cNvSpPr>
-            <a:spLocks noGrp="1"/>
-          </p:cNvSpPr>
-          <p:nvPr>
-            <p:ph idx="1"/>
-          </p:nvPr>
-        </p:nvSpPr>
-        <p:spPr/>
-        <p:txBody>
-          <a:bodyPr/>
-          <a:lstStyle/>
-          <a:p>
-            <a:r>
-              <a:rPr lang="en-US" b="1" dirty="0" err="1" smtClean="0"/>
-              <a:t>RE</a:t>
-            </a:r>
-            <a:r>
-              <a:rPr lang="en-US" dirty="0" err="1" smtClean="0"/>
-              <a:t>presentational</a:t>
-            </a:r>
-            <a:r>
-              <a:rPr lang="en-US" dirty="0" smtClean="0"/>
-              <a:t> </a:t>
-            </a:r>
-            <a:r>
-              <a:rPr lang="en-US" b="1" dirty="0"/>
-              <a:t>S</a:t>
-            </a:r>
-            <a:r>
-              <a:rPr lang="en-US" dirty="0"/>
-              <a:t>tate </a:t>
-            </a:r>
-            <a:r>
-              <a:rPr lang="en-US" b="1" dirty="0"/>
-              <a:t>T</a:t>
-            </a:r>
-            <a:r>
-              <a:rPr lang="en-US" dirty="0"/>
-              <a:t>ransfer</a:t>
-            </a:r>
-          </a:p>
-          <a:p>
-            <a:endParaRPr lang="en-US" dirty="0" smtClean="0"/>
-          </a:p>
-          <a:p>
-            <a:r>
-              <a:rPr lang="en-US" dirty="0" smtClean="0"/>
-              <a:t>Simple APIs with very few external dependencies</a:t>
-            </a:r>
-          </a:p>
-          <a:p>
-            <a:endParaRPr lang="en-US" dirty="0"/>
-          </a:p>
-          <a:p>
-            <a:r>
-              <a:rPr lang="en-US" dirty="0" smtClean="0"/>
-              <a:t>Can use the web (HTTP) to communicate</a:t>
-            </a:r>
-          </a:p>
-          <a:p>
-            <a:endParaRPr lang="en-US" dirty="0"/>
-          </a:p>
-          <a:p>
-            <a:r>
-              <a:rPr lang="en-US" dirty="0" smtClean="0"/>
-              <a:t>Can be queried by</a:t>
-            </a:r>
-          </a:p>
-          <a:p>
-            <a:pPr lvl="1"/>
-            <a:r>
-              <a:rPr lang="en-US" dirty="0" smtClean="0"/>
-              <a:t>Web browsers</a:t>
-            </a:r>
-          </a:p>
-          <a:p>
-            <a:pPr lvl="1"/>
-            <a:r>
-              <a:rPr lang="en-US" dirty="0" smtClean="0"/>
-              <a:t>Command line tools</a:t>
-            </a:r>
-          </a:p>
-          <a:p>
-            <a:pPr lvl="1"/>
-            <a:r>
-              <a:rPr lang="en-US" dirty="0" smtClean="0"/>
-              <a:t>Programming languages</a:t>
-            </a:r>
-            <a:endParaRPr lang="en-US" dirty="0"/>
-          </a:p>
-        </p:txBody>
-      </p:sp>
-      <p:pic>
-        <p:nvPicPr>
-          <p:cNvPr id="4" name="Picture 3" descr="images.jpg"/>
-          <p:cNvPicPr>
-            <a:picLocks noChangeAspect="1"/>
-          </p:cNvPicPr>
-          <p:nvPr/>
-        </p:nvPicPr>
-        <p:blipFill>
-          <a:blip r:embed="rId2">
-            <a:extLst>
-              <a:ext uri="{28A0092B-C50C-407E-A947-70E740481C1C}">
-                <a14:useLocalDpi xmlns:a14="http://schemas.microsoft.com/office/drawing/2010/main" val="0"/>
-              </a:ext>
-            </a:extLst>
-          </a:blip>
-          <a:stretch>
-            <a:fillRect/>
-          </a:stretch>
-        </p:blipFill>
-        <p:spPr>
-          <a:xfrm>
-            <a:off x="7298290" y="4524030"/>
-            <a:ext cx="1257603" cy="1252014"/>
-          </a:xfrm>
-          <a:prstGeom prst="rect">
-            <a:avLst/>
-          </a:prstGeom>
-          <a:ln>
-            <a:noFill/>
-          </a:ln>
-          <a:effectLst>
-            <a:outerShdw blurRad="292100" dist="139700" dir="2700000" algn="tl" rotWithShape="0">
-              <a:srgbClr val="333333">
-                <a:alpha val="65000"/>
-              </a:srgbClr>
-            </a:outerShdw>
-          </a:effectLst>
-        </p:spPr>
-      </p:pic>
-      <p:pic>
-        <p:nvPicPr>
-          <p:cNvPr id="6" name="Picture 5" descr="url.jpg"/>
-          <p:cNvPicPr>
-            <a:picLocks noChangeAspect="1"/>
-          </p:cNvPicPr>
-          <p:nvPr/>
-        </p:nvPicPr>
-        <p:blipFill>
-          <a:blip r:embed="rId3">
-            <a:extLst>
-              <a:ext uri="{28A0092B-C50C-407E-A947-70E740481C1C}">
-                <a14:useLocalDpi xmlns:a14="http://schemas.microsoft.com/office/drawing/2010/main" val="0"/>
-              </a:ext>
-            </a:extLst>
-          </a:blip>
-          <a:stretch>
-            <a:fillRect/>
-          </a:stretch>
-        </p:blipFill>
-        <p:spPr>
-          <a:xfrm>
-            <a:off x="4212862" y="4060960"/>
-            <a:ext cx="2866338" cy="962853"/>
-          </a:xfrm>
-          <a:prstGeom prst="roundRect">
-            <a:avLst>
-              <a:gd name="adj" fmla="val 8594"/>
-            </a:avLst>
-          </a:prstGeom>
-          <a:solidFill>
-            <a:srgbClr val="FFFFFF">
-              <a:shade val="85000"/>
-            </a:srgbClr>
-          </a:solidFill>
-          <a:ln>
-            <a:noFill/>
-          </a:ln>
-          <a:effectLst>
-            <a:reflection blurRad="12700" stA="38000" endPos="28000" dist="5000" dir="5400000" sy="-100000" algn="bl" rotWithShape="0"/>
-          </a:effectLst>
-        </p:spPr>
-      </p:pic>
-    </p:spTree>
-    <p:extLst>
-      <p:ext uri="{BB962C8B-B14F-4D97-AF65-F5344CB8AC3E}">
-        <p14:creationId xmlns:p14="http://schemas.microsoft.com/office/powerpoint/2010/main" val="1579477409"/>
-      </p:ext>
-    </p:extLst>
-  </p:cSld>
-  <p:clrMapOvr>
-    <a:masterClrMapping/>
-  </p:clrMapOvr>
-  <p:timing>
-    <p:tnLst>
-      <p:par>
-        <p:cTn xmlns:p14="http://schemas.microsoft.com/office/powerpoint/2010/main" id="1" dur="indefinite" restart="never" nodeType="tmRoot"/>
-      </p:par>
-    </p:tnLst>
-  </p:timing>
-</p:sld>
-</file>
-
-<file path=ppt/slides/slide60.xml><?xml version="1.0" encoding="utf-8"?>
+<file path=ppt/slides/slide62.xml><?xml version="1.0" encoding="utf-8"?>
 <p:sld xmlns:a="http://schemas.openxmlformats.org/drawingml/2006/main" xmlns:r="http://schemas.openxmlformats.org/officeDocument/2006/relationships" xmlns:p="http://schemas.openxmlformats.org/presentationml/2006/main">
   <p:cSld>
     <p:spTree>
@@ -23234,7 +23526,7 @@
 </p:sld>
 </file>
 
-<file path=ppt/slides/slide61.xml><?xml version="1.0" encoding="utf-8"?>
+<file path=ppt/slides/slide63.xml><?xml version="1.0" encoding="utf-8"?>
 <p:sld xmlns:a="http://schemas.openxmlformats.org/drawingml/2006/main" xmlns:r="http://schemas.openxmlformats.org/officeDocument/2006/relationships" xmlns:p="http://schemas.openxmlformats.org/presentationml/2006/main">
   <p:cSld>
     <p:spTree>
@@ -23909,7 +24201,7 @@
 </p:sld>
 </file>
 
-<file path=ppt/slides/slide62.xml><?xml version="1.0" encoding="utf-8"?>
+<file path=ppt/slides/slide64.xml><?xml version="1.0" encoding="utf-8"?>
 <p:sld xmlns:a="http://schemas.openxmlformats.org/drawingml/2006/main" xmlns:r="http://schemas.openxmlformats.org/officeDocument/2006/relationships" xmlns:p="http://schemas.openxmlformats.org/presentationml/2006/main">
   <p:cSld>
     <p:spTree>

</xml_diff>